<commit_message>
Pubs edits - cls - not final yet
</commit_message>
<xml_diff>
--- a/Day1/Ch01 HDFS.pptx
+++ b/Day1/Ch01 HDFS.pptx
@@ -277,7 +277,7 @@
                 <a:ea typeface="Tahoma" pitchFamily="34" charset="0"/>
                 <a:cs typeface="Tahoma" pitchFamily="34" charset="0"/>
               </a:rPr>
-              <a:t>449: Spark for Big Data Processing</a:t>
+              <a:t>Spark Program</a:t>
             </a:r>
           </a:p>
         </p:txBody>
@@ -799,7 +799,7 @@
                 </a:solidFill>
                 <a:latin typeface="Tahoma" pitchFamily="34" charset="0"/>
               </a:rPr>
-              <a:t>449: Spark for Big Data Processing</a:t>
+              <a:t>Spark Program</a:t>
             </a:r>
           </a:p>
         </p:txBody>
@@ -5878,7 +5878,7 @@
                 </a:solidFill>
                 <a:latin typeface="Tahoma" charset="0"/>
               </a:rPr>
-              <a:t>© 2018</a:t>
+              <a:t>© 2019</a:t>
             </a:r>
             <a:r>
               <a:rPr lang="en-US" sz="700" b="0" baseline="0" dirty="0">
@@ -6124,45 +6124,49 @@
           </a:p>
         </p:txBody>
       </p:sp>
-      <p:pic>
-        <p:nvPicPr>
-          <p:cNvPr id="14" name="Picture 55">
+      <p:sp>
+        <p:nvSpPr>
+          <p:cNvPr id="12" name="TextBox 11">
             <a:extLst>
               <a:ext uri="{FF2B5EF4-FFF2-40B4-BE49-F238E27FC236}">
-                <a16:creationId xmlns:a16="http://schemas.microsoft.com/office/drawing/2014/main" id="{972BEEED-8F56-4745-9DC5-06BEF3FA6A5C}"/>
+                <a16:creationId xmlns:a16="http://schemas.microsoft.com/office/drawing/2014/main" id="{72CDDA62-D748-4D3F-82F9-FA397BEF0ACB}"/>
               </a:ext>
             </a:extLst>
           </p:cNvPr>
-          <p:cNvPicPr>
-            <a:picLocks noChangeAspect="1" noChangeArrowheads="1"/>
-          </p:cNvPicPr>
+          <p:cNvSpPr txBox="1"/>
           <p:nvPr userDrawn="1"/>
-        </p:nvPicPr>
-        <p:blipFill>
-          <a:blip r:embed="rId20" cstate="print"/>
-          <a:srcRect/>
-          <a:stretch>
-            <a:fillRect/>
-          </a:stretch>
-        </p:blipFill>
-        <p:spPr bwMode="blackGray">
+        </p:nvSpPr>
+        <p:spPr>
           <a:xfrm>
-            <a:off x="916177" y="6563185"/>
-            <a:ext cx="870534" cy="188580"/>
+            <a:off x="0" y="6428509"/>
+            <a:ext cx="2821709" cy="429491"/>
           </a:xfrm>
           <a:prstGeom prst="rect">
             <a:avLst/>
           </a:prstGeom>
           <a:noFill/>
-          <a:ln w="9525">
-            <a:noFill/>
-            <a:miter lim="800000"/>
-            <a:headEnd/>
-            <a:tailEnd/>
-          </a:ln>
-          <a:effectLst/>
         </p:spPr>
-      </p:pic>
+        <p:txBody>
+          <a:bodyPr wrap="square" rtlCol="0" anchor="ctr" anchorCtr="0">
+            <a:noAutofit/>
+          </a:bodyPr>
+          <a:lstStyle/>
+          <a:p>
+            <a:pPr algn="ctr"/>
+            <a:r>
+              <a:rPr lang="en-US" sz="900" b="0" cap="none" baseline="0" dirty="0">
+                <a:solidFill>
+                  <a:schemeClr val="tx1"/>
+                </a:solidFill>
+                <a:latin typeface="Tahoma" panose="020B0604030504040204" pitchFamily="34" charset="0"/>
+                <a:ea typeface="Tahoma" panose="020B0604030504040204" pitchFamily="34" charset="0"/>
+                <a:cs typeface="Tahoma" panose="020B0604030504040204" pitchFamily="34" charset="0"/>
+              </a:rPr>
+              <a:t>Spark Program</a:t>
+            </a:r>
+          </a:p>
+        </p:txBody>
+      </p:sp>
     </p:spTree>
   </p:cSld>
   <p:clrMap bg1="lt1" tx1="dk1" bg2="lt2" tx2="dk2" accent1="accent1" accent2="accent2" accent3="accent3" accent4="accent4" accent5="accent5" accent6="accent6" hlink="hlink" folHlink="folHlink"/>
@@ -6384,7 +6388,7 @@
         <a:buSzPct val="100000"/>
         <a:buFont typeface="Arial" pitchFamily="34" charset="0"/>
         <a:buBlip>
-          <a:blip r:embed="rId21"/>
+          <a:blip r:embed="rId20"/>
         </a:buBlip>
         <a:defRPr b="0" i="0">
           <a:solidFill>
@@ -6429,7 +6433,7 @@
         </a:buClr>
         <a:buFont typeface="Wingdings" pitchFamily="2" charset="2"/>
         <a:buBlip>
-          <a:blip r:embed="rId22"/>
+          <a:blip r:embed="rId21"/>
         </a:buBlip>
         <a:defRPr sz="1800">
           <a:solidFill>
@@ -6475,7 +6479,7 @@
         <a:buSzPct val="100000"/>
         <a:buFont typeface="Arial" pitchFamily="34" charset="0"/>
         <a:buBlip>
-          <a:blip r:embed="rId23"/>
+          <a:blip r:embed="rId22"/>
         </a:buBlip>
         <a:defRPr sz="1800">
           <a:solidFill>
@@ -6499,7 +6503,7 @@
         <a:buSzPct val="100000"/>
         <a:buFont typeface="Tahoma" pitchFamily="34" charset="0"/>
         <a:buBlip>
-          <a:blip r:embed="rId23"/>
+          <a:blip r:embed="rId22"/>
         </a:buBlip>
         <a:defRPr sz="1400">
           <a:solidFill>
@@ -6522,7 +6526,7 @@
         <a:buSzPct val="100000"/>
         <a:buFont typeface="Tahoma" pitchFamily="34" charset="0"/>
         <a:buBlip>
-          <a:blip r:embed="rId23"/>
+          <a:blip r:embed="rId22"/>
         </a:buBlip>
         <a:defRPr sz="1400">
           <a:solidFill>
@@ -6545,7 +6549,7 @@
         <a:buSzPct val="100000"/>
         <a:buFont typeface="Tahoma" pitchFamily="34" charset="0"/>
         <a:buBlip>
-          <a:blip r:embed="rId23"/>
+          <a:blip r:embed="rId22"/>
         </a:buBlip>
         <a:defRPr sz="1400">
           <a:solidFill>
@@ -6568,7 +6572,7 @@
         <a:buSzPct val="100000"/>
         <a:buFont typeface="Tahoma" pitchFamily="34" charset="0"/>
         <a:buBlip>
-          <a:blip r:embed="rId23"/>
+          <a:blip r:embed="rId22"/>
         </a:buBlip>
         <a:defRPr sz="1400">
           <a:solidFill>
@@ -6746,7 +6750,7 @@
           <a:p>
             <a:r>
               <a:rPr lang="en-US" dirty="0"/>
-              <a:t>Spark</a:t>
+              <a:t>Spark Program</a:t>
             </a:r>
           </a:p>
         </p:txBody>
@@ -6881,7 +6885,7 @@
             </a:pPr>
             <a:r>
               <a:rPr lang="en-US" dirty="0"/>
-              <a:t>Run a stand-alone instance of HDFS</a:t>
+              <a:t>Run a standalone instance of HDFS</a:t>
             </a:r>
           </a:p>
           <a:p>
@@ -6927,6 +6931,132 @@
       </p:grpSpPr>
       <p:sp>
         <p:nvSpPr>
+          <p:cNvPr id="3" name="Content Placeholder 2"/>
+          <p:cNvSpPr>
+            <a:spLocks noGrp="1"/>
+          </p:cNvSpPr>
+          <p:nvPr>
+            <p:ph idx="1"/>
+          </p:nvPr>
+        </p:nvSpPr>
+        <p:spPr/>
+        <p:txBody>
+          <a:bodyPr/>
+          <a:lstStyle/>
+          <a:p>
+            <a:r>
+              <a:rPr lang="en-US" dirty="0"/>
+              <a:t>The Hadoop Distributed File System (HDFS) is the main storage used by Hadoop MapReduce applications</a:t>
+            </a:r>
+          </a:p>
+          <a:p>
+            <a:pPr lvl="1"/>
+            <a:r>
+              <a:rPr lang="en-US" dirty="0"/>
+              <a:t>Distributed, POSIX-like file system</a:t>
+            </a:r>
+          </a:p>
+          <a:p>
+            <a:pPr lvl="2"/>
+            <a:r>
+              <a:rPr lang="en-US" dirty="0"/>
+              <a:t>Designed to run on commodity hardware</a:t>
+            </a:r>
+          </a:p>
+          <a:p>
+            <a:pPr lvl="2"/>
+            <a:r>
+              <a:rPr lang="en-US" dirty="0"/>
+              <a:t>Scales to clusters composed of thousands of nodes</a:t>
+            </a:r>
+          </a:p>
+          <a:p>
+            <a:pPr lvl="1"/>
+            <a:r>
+              <a:rPr lang="en-US" dirty="0"/>
+              <a:t>Highly fault tolerant</a:t>
+            </a:r>
+          </a:p>
+          <a:p>
+            <a:pPr lvl="2"/>
+            <a:r>
+              <a:rPr lang="en-US" dirty="0"/>
+              <a:t>Automatically detects hardware faults</a:t>
+            </a:r>
+          </a:p>
+          <a:p>
+            <a:pPr lvl="2"/>
+            <a:r>
+              <a:rPr lang="en-US" dirty="0"/>
+              <a:t>Supports quick recovery</a:t>
+            </a:r>
+          </a:p>
+          <a:p>
+            <a:pPr lvl="1"/>
+            <a:r>
+              <a:rPr lang="en-US" dirty="0"/>
+              <a:t>Implemented in Java</a:t>
+            </a:r>
+          </a:p>
+          <a:p>
+            <a:r>
+              <a:rPr lang="en-US" dirty="0"/>
+              <a:t>Can be used as a standalone general purpose file system, but relaxes certain POSIX filesystem requirements</a:t>
+            </a:r>
+          </a:p>
+          <a:p>
+            <a:pPr lvl="1"/>
+            <a:r>
+              <a:rPr lang="en-US" dirty="0"/>
+              <a:t>Designed for storing and reading very large files (&gt;TB)</a:t>
+            </a:r>
+          </a:p>
+          <a:p>
+            <a:pPr lvl="2"/>
+            <a:r>
+              <a:rPr lang="en-US" dirty="0"/>
+              <a:t>Supports high throughput read and writes</a:t>
+            </a:r>
+          </a:p>
+          <a:p>
+            <a:pPr lvl="2"/>
+            <a:r>
+              <a:rPr lang="en-US" dirty="0"/>
+              <a:t>Write once, read many</a:t>
+            </a:r>
+          </a:p>
+          <a:p>
+            <a:pPr lvl="2"/>
+            <a:r>
+              <a:rPr lang="en-US" dirty="0"/>
+              <a:t>Aimed at batch processing</a:t>
+            </a:r>
+          </a:p>
+          <a:p>
+            <a:pPr lvl="2"/>
+            <a:r>
+              <a:rPr lang="en-US" dirty="0"/>
+              <a:t>Default block size is 128MB</a:t>
+            </a:r>
+          </a:p>
+          <a:p>
+            <a:pPr lvl="1"/>
+            <a:r>
+              <a:rPr lang="en-US" dirty="0"/>
+              <a:t>Does not support random insertion or modification of data</a:t>
+            </a:r>
+          </a:p>
+          <a:p>
+            <a:pPr lvl="1"/>
+            <a:r>
+              <a:rPr lang="en-US" dirty="0"/>
+              <a:t>Appending/truncating data is possible</a:t>
+            </a:r>
+          </a:p>
+        </p:txBody>
+      </p:sp>
+      <p:sp>
+        <p:nvSpPr>
           <p:cNvPr id="2" name="Title 1"/>
           <p:cNvSpPr>
             <a:spLocks noGrp="1"/>
@@ -6940,186 +7070,9 @@
           <a:bodyPr/>
           <a:lstStyle/>
           <a:p>
-            <a:pPr>
-              <a:defRPr/>
-            </a:pPr>
-            <a:r>
-              <a:rPr lang="en-US" dirty="0">
-                <a:ea typeface="ＭＳ Ｐゴシック" charset="0"/>
-              </a:rPr>
-              <a:t>About HDFS</a:t>
-            </a:r>
             <a:r>
               <a:rPr lang="en-US" dirty="0"/>
-              <a:t>—I</a:t>
-            </a:r>
-            <a:endParaRPr lang="en-US" dirty="0">
-              <a:ea typeface="ＭＳ Ｐゴシック" charset="0"/>
-            </a:endParaRPr>
-          </a:p>
-        </p:txBody>
-      </p:sp>
-      <p:sp>
-        <p:nvSpPr>
-          <p:cNvPr id="3" name="Content Placeholder 2"/>
-          <p:cNvSpPr>
-            <a:spLocks noGrp="1"/>
-          </p:cNvSpPr>
-          <p:nvPr>
-            <p:ph idx="1"/>
-          </p:nvPr>
-        </p:nvSpPr>
-        <p:spPr>
-          <a:xfrm>
-            <a:off x="728663" y="1218759"/>
-            <a:ext cx="7772400" cy="4937760"/>
-          </a:xfrm>
-        </p:spPr>
-        <p:txBody>
-          <a:bodyPr/>
-          <a:lstStyle/>
-          <a:p>
-            <a:pPr>
-              <a:defRPr/>
-            </a:pPr>
-            <a:r>
-              <a:rPr lang="en-US" dirty="0"/>
-              <a:t>The Hadoop Distributed File System (HDFS) is the main storage used by Hadoop MapReduce applications</a:t>
-            </a:r>
-          </a:p>
-          <a:p>
-            <a:pPr lvl="1">
-              <a:defRPr/>
-            </a:pPr>
-            <a:r>
-              <a:rPr lang="en-US" dirty="0"/>
-              <a:t>Distributed, POSIX-like file system</a:t>
-            </a:r>
-          </a:p>
-          <a:p>
-            <a:pPr lvl="2">
-              <a:defRPr/>
-            </a:pPr>
-            <a:r>
-              <a:rPr lang="en-US" dirty="0"/>
-              <a:t>Designed to run on commodity hardware</a:t>
-            </a:r>
-          </a:p>
-          <a:p>
-            <a:pPr lvl="2">
-              <a:defRPr/>
-            </a:pPr>
-            <a:r>
-              <a:rPr lang="en-US" dirty="0"/>
-              <a:t>Scales to clusters composed of thousands of nodes</a:t>
-            </a:r>
-          </a:p>
-          <a:p>
-            <a:pPr lvl="1">
-              <a:defRPr/>
-            </a:pPr>
-            <a:r>
-              <a:rPr lang="en-US" dirty="0"/>
-              <a:t>Highly fault tolerant</a:t>
-            </a:r>
-          </a:p>
-          <a:p>
-            <a:pPr lvl="2">
-              <a:defRPr/>
-            </a:pPr>
-            <a:r>
-              <a:rPr lang="en-US" dirty="0"/>
-              <a:t>Automatically detects hardware faults</a:t>
-            </a:r>
-          </a:p>
-          <a:p>
-            <a:pPr lvl="2">
-              <a:defRPr/>
-            </a:pPr>
-            <a:r>
-              <a:rPr lang="en-US" dirty="0"/>
-              <a:t>Supports quick recovery</a:t>
-            </a:r>
-          </a:p>
-          <a:p>
-            <a:pPr lvl="1">
-              <a:defRPr/>
-            </a:pPr>
-            <a:r>
-              <a:rPr lang="en-US" dirty="0"/>
-              <a:t>Implemented in Java</a:t>
-            </a:r>
-          </a:p>
-          <a:p>
-            <a:pPr>
-              <a:defRPr/>
-            </a:pPr>
-            <a:r>
-              <a:rPr lang="en-US" dirty="0"/>
-              <a:t>Can be used as a stand-alone general purpose file system, but relaxes certain POSIX filesystem requirements</a:t>
-            </a:r>
-          </a:p>
-          <a:p>
-            <a:pPr lvl="1">
-              <a:defRPr/>
-            </a:pPr>
-            <a:r>
-              <a:rPr lang="en-US" dirty="0"/>
-              <a:t>Designed for storing and reading very large files (&gt;TB)</a:t>
-            </a:r>
-          </a:p>
-          <a:p>
-            <a:pPr lvl="2">
-              <a:defRPr/>
-            </a:pPr>
-            <a:r>
-              <a:rPr lang="en-US" dirty="0"/>
-              <a:t>Supports high throughput read and writes</a:t>
-            </a:r>
-          </a:p>
-          <a:p>
-            <a:pPr lvl="2">
-              <a:defRPr/>
-            </a:pPr>
-            <a:r>
-              <a:rPr lang="en-US" dirty="0"/>
-              <a:t>Write once, read many</a:t>
-            </a:r>
-          </a:p>
-          <a:p>
-            <a:pPr lvl="2">
-              <a:defRPr/>
-            </a:pPr>
-            <a:r>
-              <a:rPr lang="en-US" dirty="0"/>
-              <a:t>Aimed at batch processing</a:t>
-            </a:r>
-          </a:p>
-          <a:p>
-            <a:pPr lvl="2">
-              <a:defRPr/>
-            </a:pPr>
-            <a:r>
-              <a:rPr lang="en-US" dirty="0"/>
-              <a:t>Default block size is 128MB</a:t>
-            </a:r>
-          </a:p>
-          <a:p>
-            <a:pPr lvl="1">
-              <a:defRPr/>
-            </a:pPr>
-            <a:r>
-              <a:rPr lang="en-US" dirty="0"/>
-              <a:t>Does not support random insertion or modification of data</a:t>
-            </a:r>
-          </a:p>
-          <a:p>
-            <a:pPr lvl="1">
-              <a:defRPr/>
-            </a:pPr>
-            <a:r>
-              <a:rPr lang="en-US" dirty="0"/>
-              <a:t>Appending/truncating data is possible</a:t>
+              <a:t>About HDFS—I</a:t>
             </a:r>
           </a:p>
         </p:txBody>
@@ -7193,7 +7146,7 @@
           <a:p>
             <a:r>
               <a:rPr lang="en-US" dirty="0"/>
-              <a:t>HDFS is used either directly or indirectly by many BigData and NoSQL applications including:</a:t>
+              <a:t>HDFS is used either directly or indirectly by many Big Data and NoSQL applications including:</a:t>
             </a:r>
           </a:p>
           <a:p>
@@ -7335,7 +7288,19 @@
             </a:pPr>
             <a:r>
               <a:rPr lang="en-US" dirty="0"/>
-              <a:t>Arranged in a master/slave architecture</a:t>
+              <a:t>Arranged in a </a:t>
+            </a:r>
+            <a:r>
+              <a:rPr lang="en-US" dirty="0">
+                <a:highlight>
+                  <a:srgbClr val="FFFF00"/>
+                </a:highlight>
+              </a:rPr>
+              <a:t>master/slave </a:t>
+            </a:r>
+            <a:r>
+              <a:rPr lang="en-US" dirty="0"/>
+              <a:t>architecture</a:t>
             </a:r>
           </a:p>
           <a:p>
@@ -7344,7 +7309,7 @@
             </a:pPr>
             <a:r>
               <a:rPr lang="en-US" dirty="0"/>
-              <a:t>Core HDFS Services include:</a:t>
+              <a:t>Core HDFS services include:</a:t>
             </a:r>
           </a:p>
           <a:p>
@@ -7499,6 +7464,171 @@
       </p:grpSpPr>
       <p:sp>
         <p:nvSpPr>
+          <p:cNvPr id="3" name="Content Placeholder 2"/>
+          <p:cNvSpPr>
+            <a:spLocks noGrp="1"/>
+          </p:cNvSpPr>
+          <p:nvPr>
+            <p:ph idx="1"/>
+          </p:nvPr>
+        </p:nvSpPr>
+        <p:spPr/>
+        <p:txBody>
+          <a:bodyPr/>
+          <a:lstStyle/>
+          <a:p>
+            <a:r>
+              <a:rPr lang="en-US" dirty="0"/>
+              <a:t>To start Hadoop on the VM</a:t>
+            </a:r>
+          </a:p>
+          <a:p>
+            <a:pPr lvl="1"/>
+            <a:r>
+              <a:rPr lang="en-US" dirty="0"/>
+              <a:t>Open a terminal window and type the following commands:</a:t>
+            </a:r>
+          </a:p>
+          <a:p>
+            <a:pPr marL="457200" lvl="2" indent="0">
+              <a:buNone/>
+            </a:pPr>
+            <a:r>
+              <a:rPr lang="en-US" dirty="0">
+                <a:latin typeface="Courier New" panose="02070309020205020404" pitchFamily="49" charset="0"/>
+                <a:cs typeface="Courier New" panose="02070309020205020404" pitchFamily="49" charset="0"/>
+              </a:rPr>
+              <a:t>su – </a:t>
+            </a:r>
+          </a:p>
+          <a:p>
+            <a:pPr marL="457200" lvl="2" indent="0">
+              <a:buNone/>
+            </a:pPr>
+            <a:r>
+              <a:rPr lang="en-US" dirty="0">
+                <a:latin typeface="Courier New" panose="02070309020205020404" pitchFamily="49" charset="0"/>
+                <a:cs typeface="Courier New" panose="02070309020205020404" pitchFamily="49" charset="0"/>
+              </a:rPr>
+              <a:t>cd /home/student</a:t>
+            </a:r>
+          </a:p>
+          <a:p>
+            <a:pPr marL="457200" lvl="2" indent="0">
+              <a:buNone/>
+            </a:pPr>
+            <a:r>
+              <a:rPr lang="en-US" dirty="0">
+                <a:latin typeface="Courier New" panose="02070309020205020404" pitchFamily="49" charset="0"/>
+                <a:cs typeface="Courier New" panose="02070309020205020404" pitchFamily="49" charset="0"/>
+              </a:rPr>
+              <a:t>./start-hadoop.sh</a:t>
+            </a:r>
+          </a:p>
+          <a:p>
+            <a:pPr marL="457200" lvl="2" indent="0">
+              <a:buNone/>
+            </a:pPr>
+            <a:r>
+              <a:rPr lang="en-US" dirty="0">
+                <a:latin typeface="Courier New" panose="02070309020205020404" pitchFamily="49" charset="0"/>
+                <a:cs typeface="Courier New" panose="02070309020205020404" pitchFamily="49" charset="0"/>
+              </a:rPr>
+              <a:t>jps</a:t>
+            </a:r>
+          </a:p>
+          <a:p>
+            <a:pPr lvl="2"/>
+            <a:endParaRPr lang="en-US" dirty="0"/>
+          </a:p>
+          <a:p>
+            <a:r>
+              <a:rPr lang="en-US" dirty="0"/>
+              <a:t>From a command line, enter the following commands:</a:t>
+            </a:r>
+          </a:p>
+          <a:p>
+            <a:pPr marL="461963" lvl="1" indent="0">
+              <a:buNone/>
+            </a:pPr>
+            <a:r>
+              <a:rPr lang="en-US" dirty="0">
+                <a:latin typeface="Courier New" panose="02070309020205020404" pitchFamily="49" charset="0"/>
+                <a:cs typeface="Courier New" panose="02070309020205020404" pitchFamily="49" charset="0"/>
+              </a:rPr>
+              <a:t>hdfs</a:t>
+            </a:r>
+          </a:p>
+          <a:p>
+            <a:pPr marL="461963" lvl="1" indent="0">
+              <a:buNone/>
+            </a:pPr>
+            <a:r>
+              <a:rPr lang="en-US" dirty="0">
+                <a:latin typeface="Courier New" panose="02070309020205020404" pitchFamily="49" charset="0"/>
+                <a:cs typeface="Courier New" panose="02070309020205020404" pitchFamily="49" charset="0"/>
+              </a:rPr>
+              <a:t>hdfs dfs</a:t>
+            </a:r>
+          </a:p>
+          <a:p>
+            <a:pPr marL="461963" lvl="1" indent="0">
+              <a:buNone/>
+            </a:pPr>
+            <a:r>
+              <a:rPr lang="en-US" dirty="0">
+                <a:latin typeface="Courier New" panose="02070309020205020404" pitchFamily="49" charset="0"/>
+                <a:cs typeface="Courier New" panose="02070309020205020404" pitchFamily="49" charset="0"/>
+              </a:rPr>
+              <a:t>hdfs dfs –ls /</a:t>
+            </a:r>
+          </a:p>
+          <a:p>
+            <a:pPr marL="461963" lvl="1" indent="0">
+              <a:buNone/>
+            </a:pPr>
+            <a:r>
+              <a:rPr lang="en-US" dirty="0">
+                <a:latin typeface="Courier New" panose="02070309020205020404" pitchFamily="49" charset="0"/>
+                <a:cs typeface="Courier New" panose="02070309020205020404" pitchFamily="49" charset="0"/>
+              </a:rPr>
+              <a:t>hdfs dfs –put ~/ROI/datasets/northwind/CSV/categories /</a:t>
+            </a:r>
+          </a:p>
+          <a:p>
+            <a:pPr marL="461963" lvl="1" indent="0">
+              <a:buNone/>
+            </a:pPr>
+            <a:r>
+              <a:rPr lang="en-US" dirty="0">
+                <a:latin typeface="Courier New" panose="02070309020205020404" pitchFamily="49" charset="0"/>
+                <a:cs typeface="Courier New" panose="02070309020205020404" pitchFamily="49" charset="0"/>
+              </a:rPr>
+              <a:t>hdfs dfs –ls /</a:t>
+            </a:r>
+          </a:p>
+          <a:p>
+            <a:pPr marL="457200" lvl="2" indent="0">
+              <a:buNone/>
+            </a:pPr>
+            <a:endParaRPr lang="en-US" dirty="0"/>
+          </a:p>
+          <a:p>
+            <a:pPr marL="457200" lvl="2" indent="0">
+              <a:buNone/>
+            </a:pPr>
+            <a:endParaRPr lang="en-US" dirty="0"/>
+          </a:p>
+          <a:p>
+            <a:pPr marL="511175" lvl="3" indent="0">
+              <a:buNone/>
+            </a:pPr>
+            <a:endParaRPr lang="en-US" dirty="0"/>
+          </a:p>
+        </p:txBody>
+      </p:sp>
+      <p:sp>
+        <p:nvSpPr>
           <p:cNvPr id="2" name="Title 1"/>
           <p:cNvSpPr>
             <a:spLocks noGrp="1"/>
@@ -7519,272 +7649,6 @@
           </a:p>
         </p:txBody>
       </p:sp>
-      <p:sp>
-        <p:nvSpPr>
-          <p:cNvPr id="3" name="Content Placeholder 2"/>
-          <p:cNvSpPr>
-            <a:spLocks noGrp="1"/>
-          </p:cNvSpPr>
-          <p:nvPr>
-            <p:ph idx="1"/>
-          </p:nvPr>
-        </p:nvSpPr>
-        <p:spPr>
-          <a:xfrm>
-            <a:off x="557567" y="1266825"/>
-            <a:ext cx="8318488" cy="4986911"/>
-          </a:xfrm>
-        </p:spPr>
-        <p:txBody>
-          <a:bodyPr/>
-          <a:lstStyle/>
-          <a:p>
-            <a:r>
-              <a:rPr lang="en-US" dirty="0"/>
-              <a:t>To start </a:t>
-            </a:r>
-            <a:r>
-              <a:rPr lang="en-US" dirty="0" err="1"/>
-              <a:t>hadoop</a:t>
-            </a:r>
-            <a:r>
-              <a:rPr lang="en-US" dirty="0"/>
-              <a:t> on the VM</a:t>
-            </a:r>
-          </a:p>
-          <a:p>
-            <a:pPr lvl="1"/>
-            <a:r>
-              <a:rPr lang="en-US" dirty="0"/>
-              <a:t>open a terminal window and type the following commands:</a:t>
-            </a:r>
-          </a:p>
-          <a:p>
-            <a:pPr marL="457200" lvl="2" indent="0">
-              <a:buNone/>
-            </a:pPr>
-            <a:r>
-              <a:rPr lang="en-US" dirty="0" err="1">
-                <a:latin typeface="Courier New" panose="02070309020205020404" pitchFamily="49" charset="0"/>
-                <a:cs typeface="Courier New" panose="02070309020205020404" pitchFamily="49" charset="0"/>
-              </a:rPr>
-              <a:t>su</a:t>
-            </a:r>
-            <a:r>
-              <a:rPr lang="en-US" dirty="0">
-                <a:latin typeface="Courier New" panose="02070309020205020404" pitchFamily="49" charset="0"/>
-                <a:cs typeface="Courier New" panose="02070309020205020404" pitchFamily="49" charset="0"/>
-              </a:rPr>
-              <a:t> – </a:t>
-            </a:r>
-          </a:p>
-          <a:p>
-            <a:pPr marL="457200" lvl="2" indent="0">
-              <a:buNone/>
-            </a:pPr>
-            <a:r>
-              <a:rPr lang="en-US" dirty="0">
-                <a:latin typeface="Courier New" panose="02070309020205020404" pitchFamily="49" charset="0"/>
-                <a:cs typeface="Courier New" panose="02070309020205020404" pitchFamily="49" charset="0"/>
-              </a:rPr>
-              <a:t>cd /home/student</a:t>
-            </a:r>
-          </a:p>
-          <a:p>
-            <a:pPr marL="457200" lvl="2" indent="0">
-              <a:buNone/>
-            </a:pPr>
-            <a:r>
-              <a:rPr lang="en-US" dirty="0">
-                <a:latin typeface="Courier New" panose="02070309020205020404" pitchFamily="49" charset="0"/>
-                <a:cs typeface="Courier New" panose="02070309020205020404" pitchFamily="49" charset="0"/>
-              </a:rPr>
-              <a:t>./start-</a:t>
-            </a:r>
-            <a:r>
-              <a:rPr lang="en-US" dirty="0" err="1">
-                <a:latin typeface="Courier New" panose="02070309020205020404" pitchFamily="49" charset="0"/>
-                <a:cs typeface="Courier New" panose="02070309020205020404" pitchFamily="49" charset="0"/>
-              </a:rPr>
-              <a:t>hadoop.sh</a:t>
-            </a:r>
-            <a:endParaRPr lang="en-US" dirty="0">
-              <a:latin typeface="Courier New" panose="02070309020205020404" pitchFamily="49" charset="0"/>
-              <a:cs typeface="Courier New" panose="02070309020205020404" pitchFamily="49" charset="0"/>
-            </a:endParaRPr>
-          </a:p>
-          <a:p>
-            <a:pPr marL="457200" lvl="2" indent="0">
-              <a:buNone/>
-            </a:pPr>
-            <a:r>
-              <a:rPr lang="en-US" dirty="0" err="1">
-                <a:latin typeface="Courier New" panose="02070309020205020404" pitchFamily="49" charset="0"/>
-                <a:cs typeface="Courier New" panose="02070309020205020404" pitchFamily="49" charset="0"/>
-              </a:rPr>
-              <a:t>jps</a:t>
-            </a:r>
-            <a:endParaRPr lang="en-US" dirty="0">
-              <a:latin typeface="Courier New" panose="02070309020205020404" pitchFamily="49" charset="0"/>
-              <a:cs typeface="Courier New" panose="02070309020205020404" pitchFamily="49" charset="0"/>
-            </a:endParaRPr>
-          </a:p>
-          <a:p>
-            <a:pPr lvl="2"/>
-            <a:endParaRPr lang="en-US" dirty="0"/>
-          </a:p>
-          <a:p>
-            <a:r>
-              <a:rPr lang="en-US" dirty="0"/>
-              <a:t>From a command line, enter the following commands:</a:t>
-            </a:r>
-          </a:p>
-          <a:p>
-            <a:pPr marL="461963" lvl="1" indent="0">
-              <a:buNone/>
-            </a:pPr>
-            <a:r>
-              <a:rPr lang="en-US" dirty="0">
-                <a:latin typeface="Courier New" panose="02070309020205020404" pitchFamily="49" charset="0"/>
-                <a:cs typeface="Courier New" panose="02070309020205020404" pitchFamily="49" charset="0"/>
-              </a:rPr>
-              <a:t>hdfs</a:t>
-            </a:r>
-          </a:p>
-          <a:p>
-            <a:pPr marL="461963" lvl="1" indent="0">
-              <a:buNone/>
-            </a:pPr>
-            <a:r>
-              <a:rPr lang="en-US" dirty="0">
-                <a:latin typeface="Courier New" panose="02070309020205020404" pitchFamily="49" charset="0"/>
-                <a:cs typeface="Courier New" panose="02070309020205020404" pitchFamily="49" charset="0"/>
-              </a:rPr>
-              <a:t>hdfs dfs</a:t>
-            </a:r>
-          </a:p>
-          <a:p>
-            <a:pPr marL="461963" lvl="1" indent="0">
-              <a:buNone/>
-            </a:pPr>
-            <a:r>
-              <a:rPr lang="en-US" dirty="0">
-                <a:latin typeface="Courier New" panose="02070309020205020404" pitchFamily="49" charset="0"/>
-                <a:cs typeface="Courier New" panose="02070309020205020404" pitchFamily="49" charset="0"/>
-              </a:rPr>
-              <a:t>hdfs dfs –ls /</a:t>
-            </a:r>
-          </a:p>
-          <a:p>
-            <a:pPr marL="461963" lvl="1" indent="0">
-              <a:buNone/>
-            </a:pPr>
-            <a:r>
-              <a:rPr lang="en-US" dirty="0" err="1">
-                <a:latin typeface="Courier New" panose="02070309020205020404" pitchFamily="49" charset="0"/>
-                <a:cs typeface="Courier New" panose="02070309020205020404" pitchFamily="49" charset="0"/>
-              </a:rPr>
-              <a:t>hdfs</a:t>
-            </a:r>
-            <a:r>
-              <a:rPr lang="en-US" dirty="0">
-                <a:latin typeface="Courier New" panose="02070309020205020404" pitchFamily="49" charset="0"/>
-                <a:cs typeface="Courier New" panose="02070309020205020404" pitchFamily="49" charset="0"/>
-              </a:rPr>
-              <a:t> dfs –put ~/ROI/datasets/</a:t>
-            </a:r>
-            <a:r>
-              <a:rPr lang="en-US" dirty="0" err="1">
-                <a:latin typeface="Courier New" panose="02070309020205020404" pitchFamily="49" charset="0"/>
-                <a:cs typeface="Courier New" panose="02070309020205020404" pitchFamily="49" charset="0"/>
-              </a:rPr>
-              <a:t>northwind</a:t>
-            </a:r>
-            <a:r>
-              <a:rPr lang="en-US" dirty="0">
-                <a:latin typeface="Courier New" panose="02070309020205020404" pitchFamily="49" charset="0"/>
-                <a:cs typeface="Courier New" panose="02070309020205020404" pitchFamily="49" charset="0"/>
-              </a:rPr>
-              <a:t>/CSV/categories /</a:t>
-            </a:r>
-          </a:p>
-          <a:p>
-            <a:pPr marL="461963" lvl="1" indent="0">
-              <a:buNone/>
-            </a:pPr>
-            <a:r>
-              <a:rPr lang="en-US" dirty="0" err="1">
-                <a:latin typeface="Courier New" panose="02070309020205020404" pitchFamily="49" charset="0"/>
-                <a:cs typeface="Courier New" panose="02070309020205020404" pitchFamily="49" charset="0"/>
-              </a:rPr>
-              <a:t>hdfs</a:t>
-            </a:r>
-            <a:r>
-              <a:rPr lang="en-US" dirty="0">
-                <a:latin typeface="Courier New" panose="02070309020205020404" pitchFamily="49" charset="0"/>
-                <a:cs typeface="Courier New" panose="02070309020205020404" pitchFamily="49" charset="0"/>
-              </a:rPr>
-              <a:t> </a:t>
-            </a:r>
-            <a:r>
-              <a:rPr lang="en-US" dirty="0" err="1">
-                <a:latin typeface="Courier New" panose="02070309020205020404" pitchFamily="49" charset="0"/>
-                <a:cs typeface="Courier New" panose="02070309020205020404" pitchFamily="49" charset="0"/>
-              </a:rPr>
-              <a:t>dfs</a:t>
-            </a:r>
-            <a:r>
-              <a:rPr lang="en-US" dirty="0">
-                <a:latin typeface="Courier New" panose="02070309020205020404" pitchFamily="49" charset="0"/>
-                <a:cs typeface="Courier New" panose="02070309020205020404" pitchFamily="49" charset="0"/>
-              </a:rPr>
-              <a:t> –ls /</a:t>
-            </a:r>
-          </a:p>
-          <a:p>
-            <a:pPr marL="457200" lvl="2" indent="0">
-              <a:buNone/>
-            </a:pPr>
-            <a:endParaRPr lang="en-US" dirty="0"/>
-          </a:p>
-          <a:p>
-            <a:pPr marL="457200" lvl="2" indent="0">
-              <a:buNone/>
-            </a:pPr>
-            <a:endParaRPr lang="en-US" dirty="0"/>
-          </a:p>
-          <a:p>
-            <a:pPr marL="511175" lvl="3" indent="0">
-              <a:buNone/>
-            </a:pPr>
-            <a:endParaRPr lang="en-US" dirty="0"/>
-          </a:p>
-        </p:txBody>
-      </p:sp>
-      <p:pic>
-        <p:nvPicPr>
-          <p:cNvPr id="4" name="Picture 3"/>
-          <p:cNvPicPr>
-            <a:picLocks noChangeAspect="1"/>
-          </p:cNvPicPr>
-          <p:nvPr/>
-        </p:nvPicPr>
-        <p:blipFill>
-          <a:blip/>
-          <a:stretch>
-            <a:fillRect/>
-          </a:stretch>
-        </p:blipFill>
-        <p:spPr>
-          <a:xfrm>
-            <a:off x="8132279" y="240003"/>
-            <a:ext cx="743776" cy="737680"/>
-          </a:xfrm>
-          <a:prstGeom prst="rect">
-            <a:avLst/>
-          </a:prstGeom>
-        </p:spPr>
-      </p:pic>
     </p:spTree>
     <p:extLst>
       <p:ext uri="{BB962C8B-B14F-4D97-AF65-F5344CB8AC3E}">
@@ -7817,6 +7681,112 @@
       </p:grpSpPr>
       <p:sp>
         <p:nvSpPr>
+          <p:cNvPr id="3" name="Content Placeholder 2"/>
+          <p:cNvSpPr>
+            <a:spLocks noGrp="1"/>
+          </p:cNvSpPr>
+          <p:nvPr>
+            <p:ph idx="1"/>
+          </p:nvPr>
+        </p:nvSpPr>
+        <p:spPr/>
+        <p:txBody>
+          <a:bodyPr/>
+          <a:lstStyle/>
+          <a:p>
+            <a:r>
+              <a:rPr lang="en-US" dirty="0"/>
+              <a:t>As we have seen, HDFS provides a command line interface </a:t>
+            </a:r>
+          </a:p>
+          <a:p>
+            <a:r>
+              <a:rPr lang="en-US" dirty="0"/>
+              <a:t>From a command line, enter the following commands:</a:t>
+            </a:r>
+          </a:p>
+          <a:p>
+            <a:pPr marL="461963" lvl="1" indent="0">
+              <a:buNone/>
+            </a:pPr>
+            <a:r>
+              <a:rPr lang="en-US" dirty="0">
+                <a:latin typeface="Courier New" panose="02070309020205020404" pitchFamily="49" charset="0"/>
+                <a:cs typeface="Courier New" panose="02070309020205020404" pitchFamily="49" charset="0"/>
+              </a:rPr>
+              <a:t>hdfs</a:t>
+            </a:r>
+          </a:p>
+          <a:p>
+            <a:pPr marL="461963" lvl="1" indent="0">
+              <a:buNone/>
+            </a:pPr>
+            <a:r>
+              <a:rPr lang="en-US" dirty="0">
+                <a:latin typeface="Courier New" panose="02070309020205020404" pitchFamily="49" charset="0"/>
+                <a:cs typeface="Courier New" panose="02070309020205020404" pitchFamily="49" charset="0"/>
+              </a:rPr>
+              <a:t>hdfs dfs</a:t>
+            </a:r>
+          </a:p>
+          <a:p>
+            <a:pPr marL="461963" lvl="1" indent="0">
+              <a:buNone/>
+            </a:pPr>
+            <a:r>
+              <a:rPr lang="en-US" dirty="0">
+                <a:latin typeface="Courier New" panose="02070309020205020404" pitchFamily="49" charset="0"/>
+                <a:cs typeface="Courier New" panose="02070309020205020404" pitchFamily="49" charset="0"/>
+              </a:rPr>
+              <a:t>hdfs dfs –ls /</a:t>
+            </a:r>
+          </a:p>
+          <a:p>
+            <a:pPr marL="461963" lvl="1" indent="0">
+              <a:buNone/>
+            </a:pPr>
+            <a:r>
+              <a:rPr lang="en-US" dirty="0">
+                <a:latin typeface="Courier New" panose="02070309020205020404" pitchFamily="49" charset="0"/>
+                <a:cs typeface="Courier New" panose="02070309020205020404" pitchFamily="49" charset="0"/>
+              </a:rPr>
+              <a:t>hdfs dfs –put ~/ROI/datasets/northwind/CSV/categories /</a:t>
+            </a:r>
+          </a:p>
+          <a:p>
+            <a:pPr marL="461963" lvl="1" indent="0">
+              <a:buNone/>
+            </a:pPr>
+            <a:r>
+              <a:rPr lang="en-US" dirty="0">
+                <a:latin typeface="Courier New" panose="02070309020205020404" pitchFamily="49" charset="0"/>
+                <a:cs typeface="Courier New" panose="02070309020205020404" pitchFamily="49" charset="0"/>
+              </a:rPr>
+              <a:t>hdfs dfs –ls /</a:t>
+            </a:r>
+          </a:p>
+          <a:p>
+            <a:pPr marL="457200" lvl="2" indent="0">
+              <a:buNone/>
+            </a:pPr>
+            <a:endParaRPr lang="en-US" dirty="0"/>
+          </a:p>
+          <a:p>
+            <a:pPr marL="457200" lvl="2" indent="0">
+              <a:buNone/>
+            </a:pPr>
+            <a:endParaRPr lang="en-US" dirty="0"/>
+          </a:p>
+          <a:p>
+            <a:pPr marL="511175" lvl="3" indent="0">
+              <a:buNone/>
+            </a:pPr>
+            <a:endParaRPr lang="en-US" dirty="0"/>
+          </a:p>
+        </p:txBody>
+      </p:sp>
+      <p:sp>
+        <p:nvSpPr>
           <p:cNvPr id="2" name="Title 1"/>
           <p:cNvSpPr>
             <a:spLocks noGrp="1"/>
@@ -7837,183 +7807,6 @@
           </a:p>
         </p:txBody>
       </p:sp>
-      <p:sp>
-        <p:nvSpPr>
-          <p:cNvPr id="3" name="Content Placeholder 2"/>
-          <p:cNvSpPr>
-            <a:spLocks noGrp="1"/>
-          </p:cNvSpPr>
-          <p:nvPr>
-            <p:ph idx="1"/>
-          </p:nvPr>
-        </p:nvSpPr>
-        <p:spPr>
-          <a:xfrm>
-            <a:off x="557567" y="1266825"/>
-            <a:ext cx="8318488" cy="4986911"/>
-          </a:xfrm>
-        </p:spPr>
-        <p:txBody>
-          <a:bodyPr/>
-          <a:lstStyle/>
-          <a:p>
-            <a:r>
-              <a:rPr lang="en-US" dirty="0"/>
-              <a:t>As we have seen, HDFS provides a command line interface </a:t>
-            </a:r>
-          </a:p>
-          <a:p>
-            <a:r>
-              <a:rPr lang="en-US" dirty="0"/>
-              <a:t>From a command line, enter the following commands:</a:t>
-            </a:r>
-          </a:p>
-          <a:p>
-            <a:pPr marL="461963" lvl="1" indent="0">
-              <a:buNone/>
-            </a:pPr>
-            <a:r>
-              <a:rPr lang="en-US" dirty="0">
-                <a:latin typeface="Courier New" panose="02070309020205020404" pitchFamily="49" charset="0"/>
-                <a:cs typeface="Courier New" panose="02070309020205020404" pitchFamily="49" charset="0"/>
-              </a:rPr>
-              <a:t>hdfs</a:t>
-            </a:r>
-          </a:p>
-          <a:p>
-            <a:pPr marL="461963" lvl="1" indent="0">
-              <a:buNone/>
-            </a:pPr>
-            <a:r>
-              <a:rPr lang="en-US" dirty="0">
-                <a:latin typeface="Courier New" panose="02070309020205020404" pitchFamily="49" charset="0"/>
-                <a:cs typeface="Courier New" panose="02070309020205020404" pitchFamily="49" charset="0"/>
-              </a:rPr>
-              <a:t>hdfs dfs</a:t>
-            </a:r>
-          </a:p>
-          <a:p>
-            <a:pPr marL="461963" lvl="1" indent="0">
-              <a:buNone/>
-            </a:pPr>
-            <a:r>
-              <a:rPr lang="en-US" dirty="0">
-                <a:latin typeface="Courier New" panose="02070309020205020404" pitchFamily="49" charset="0"/>
-                <a:cs typeface="Courier New" panose="02070309020205020404" pitchFamily="49" charset="0"/>
-              </a:rPr>
-              <a:t>hdfs dfs –ls /</a:t>
-            </a:r>
-          </a:p>
-          <a:p>
-            <a:pPr marL="461963" lvl="1" indent="0">
-              <a:buNone/>
-            </a:pPr>
-            <a:r>
-              <a:rPr lang="en-US" dirty="0" err="1">
-                <a:latin typeface="Courier New" panose="02070309020205020404" pitchFamily="49" charset="0"/>
-                <a:cs typeface="Courier New" panose="02070309020205020404" pitchFamily="49" charset="0"/>
-              </a:rPr>
-              <a:t>hdfs</a:t>
-            </a:r>
-            <a:r>
-              <a:rPr lang="en-US" dirty="0">
-                <a:latin typeface="Courier New" panose="02070309020205020404" pitchFamily="49" charset="0"/>
-                <a:cs typeface="Courier New" panose="02070309020205020404" pitchFamily="49" charset="0"/>
-              </a:rPr>
-              <a:t> dfs –put ~/ROI/datasets/</a:t>
-            </a:r>
-            <a:r>
-              <a:rPr lang="en-US" dirty="0" err="1">
-                <a:latin typeface="Courier New" panose="02070309020205020404" pitchFamily="49" charset="0"/>
-                <a:cs typeface="Courier New" panose="02070309020205020404" pitchFamily="49" charset="0"/>
-              </a:rPr>
-              <a:t>northwind</a:t>
-            </a:r>
-            <a:r>
-              <a:rPr lang="en-US" dirty="0">
-                <a:latin typeface="Courier New" panose="02070309020205020404" pitchFamily="49" charset="0"/>
-                <a:cs typeface="Courier New" panose="02070309020205020404" pitchFamily="49" charset="0"/>
-              </a:rPr>
-              <a:t>/CSV/categories /</a:t>
-            </a:r>
-          </a:p>
-          <a:p>
-            <a:pPr marL="461963" lvl="1" indent="0">
-              <a:buNone/>
-            </a:pPr>
-            <a:r>
-              <a:rPr lang="en-US" dirty="0" err="1">
-                <a:latin typeface="Courier New" panose="02070309020205020404" pitchFamily="49" charset="0"/>
-                <a:cs typeface="Courier New" panose="02070309020205020404" pitchFamily="49" charset="0"/>
-              </a:rPr>
-              <a:t>hdfs</a:t>
-            </a:r>
-            <a:r>
-              <a:rPr lang="en-US" dirty="0">
-                <a:latin typeface="Courier New" panose="02070309020205020404" pitchFamily="49" charset="0"/>
-                <a:cs typeface="Courier New" panose="02070309020205020404" pitchFamily="49" charset="0"/>
-              </a:rPr>
-              <a:t> </a:t>
-            </a:r>
-            <a:r>
-              <a:rPr lang="en-US" dirty="0" err="1">
-                <a:latin typeface="Courier New" panose="02070309020205020404" pitchFamily="49" charset="0"/>
-                <a:cs typeface="Courier New" panose="02070309020205020404" pitchFamily="49" charset="0"/>
-              </a:rPr>
-              <a:t>dfs</a:t>
-            </a:r>
-            <a:r>
-              <a:rPr lang="en-US" dirty="0">
-                <a:latin typeface="Courier New" panose="02070309020205020404" pitchFamily="49" charset="0"/>
-                <a:cs typeface="Courier New" panose="02070309020205020404" pitchFamily="49" charset="0"/>
-              </a:rPr>
-              <a:t> –ls /</a:t>
-            </a:r>
-          </a:p>
-          <a:p>
-            <a:pPr marL="457200" lvl="2" indent="0">
-              <a:buNone/>
-            </a:pPr>
-            <a:endParaRPr lang="en-US" dirty="0"/>
-          </a:p>
-          <a:p>
-            <a:pPr marL="457200" lvl="2" indent="0">
-              <a:buNone/>
-            </a:pPr>
-            <a:endParaRPr lang="en-US" dirty="0"/>
-          </a:p>
-          <a:p>
-            <a:pPr marL="511175" lvl="3" indent="0">
-              <a:buNone/>
-            </a:pPr>
-            <a:endParaRPr lang="en-US" dirty="0"/>
-          </a:p>
-        </p:txBody>
-      </p:sp>
-      <p:pic>
-        <p:nvPicPr>
-          <p:cNvPr id="4" name="Picture 3"/>
-          <p:cNvPicPr>
-            <a:picLocks noChangeAspect="1"/>
-          </p:cNvPicPr>
-          <p:nvPr/>
-        </p:nvPicPr>
-        <p:blipFill>
-          <a:blip/>
-          <a:stretch>
-            <a:fillRect/>
-          </a:stretch>
-        </p:blipFill>
-        <p:spPr>
-          <a:xfrm>
-            <a:off x="8132279" y="240003"/>
-            <a:ext cx="743776" cy="737680"/>
-          </a:xfrm>
-          <a:prstGeom prst="rect">
-            <a:avLst/>
-          </a:prstGeom>
-        </p:spPr>
-      </p:pic>
     </p:spTree>
     <p:extLst>
       <p:ext uri="{BB962C8B-B14F-4D97-AF65-F5344CB8AC3E}">
@@ -8112,7 +7905,7 @@
             </a:pPr>
             <a:r>
               <a:rPr lang="en-US" dirty="0"/>
-              <a:t>Ran a stand-alone instance of HDFS</a:t>
+              <a:t>Ran a standalone instance of HDFS</a:t>
             </a:r>
           </a:p>
           <a:p>
@@ -9342,6 +9135,20 @@
 </file>
 
 <file path=customXml/item1.xml><?xml version="1.0" encoding="utf-8"?>
+<p:properties xmlns:p="http://schemas.microsoft.com/office/2006/metadata/properties" xmlns:xsi="http://www.w3.org/2001/XMLSchema-instance" xmlns:pc="http://schemas.microsoft.com/office/infopath/2007/PartnerControls">
+  <documentManagement>
+    <_dlc_DocId xmlns="037063e9-a85e-4c78-8627-f1a9315663e5">EVEA5JW6U4JV-6-9770</_dlc_DocId>
+    <_dlc_DocIdUrl xmlns="037063e9-a85e-4c78-8627-f1a9315663e5">
+      <Url>https://portal.roitraining.com/Courses/_layouts/DocIdRedir.aspx?ID=EVEA5JW6U4JV-6-9770</Url>
+      <Description>EVEA5JW6U4JV-6-9770</Description>
+    </_dlc_DocIdUrl>
+    <Date_x0020_last_x0020_used xmlns="027ed24f-5970-4294-be5c-0919c5aaa214" xsi:nil="true"/>
+    <Customization_x0020_Information xmlns="027ed24f-5970-4294-be5c-0919c5aaa214" xsi:nil="true"/>
+  </documentManagement>
+</p:properties>
+</file>
+
+<file path=customXml/item2.xml><?xml version="1.0" encoding="utf-8"?>
 <ct:contentTypeSchema xmlns:ct="http://schemas.microsoft.com/office/2006/metadata/contentType" xmlns:ma="http://schemas.microsoft.com/office/2006/metadata/properties/metaAttributes" ct:_="" ma:_="" ma:contentTypeName="Document" ma:contentTypeID="0x0101006B08A054FD435346B287BB258D6D8C2A" ma:contentTypeVersion="2" ma:contentTypeDescription="Create a new document." ma:contentTypeScope="" ma:versionID="6146b90b4382322d8952632f355192b7">
   <xsd:schema xmlns:xsd="http://www.w3.org/2001/XMLSchema" xmlns:xs="http://www.w3.org/2001/XMLSchema" xmlns:p="http://schemas.microsoft.com/office/2006/metadata/properties" xmlns:ns2="027ed24f-5970-4294-be5c-0919c5aaa214" xmlns:ns3="037063e9-a85e-4c78-8627-f1a9315663e5" targetNamespace="http://schemas.microsoft.com/office/2006/metadata/properties" ma:root="true" ma:fieldsID="b5d91f802dafd2e22aeea528efbe2d3e" ns2:_="" ns3:_="">
     <xsd:import namespace="027ed24f-5970-4294-be5c-0919c5aaa214"/>
@@ -9507,30 +9314,7 @@
 </ct:contentTypeSchema>
 </file>
 
-<file path=customXml/item2.xml><?xml version="1.0" encoding="utf-8"?>
-<p:properties xmlns:p="http://schemas.microsoft.com/office/2006/metadata/properties" xmlns:xsi="http://www.w3.org/2001/XMLSchema-instance" xmlns:pc="http://schemas.microsoft.com/office/infopath/2007/PartnerControls">
-  <documentManagement>
-    <_dlc_DocId xmlns="037063e9-a85e-4c78-8627-f1a9315663e5">EVEA5JW6U4JV-6-9770</_dlc_DocId>
-    <_dlc_DocIdUrl xmlns="037063e9-a85e-4c78-8627-f1a9315663e5">
-      <Url>https://portal.roitraining.com/Courses/_layouts/DocIdRedir.aspx?ID=EVEA5JW6U4JV-6-9770</Url>
-      <Description>EVEA5JW6U4JV-6-9770</Description>
-    </_dlc_DocIdUrl>
-    <Date_x0020_last_x0020_used xmlns="027ed24f-5970-4294-be5c-0919c5aaa214" xsi:nil="true"/>
-    <Customization_x0020_Information xmlns="027ed24f-5970-4294-be5c-0919c5aaa214" xsi:nil="true"/>
-  </documentManagement>
-</p:properties>
-</file>
-
 <file path=customXml/item3.xml><?xml version="1.0" encoding="utf-8"?>
-<?mso-contentType ?>
-<FormTemplates xmlns="http://schemas.microsoft.com/sharepoint/v3/contenttype/forms">
-  <Display>DocumentLibraryForm</Display>
-  <Edit>DocumentLibraryForm</Edit>
-  <New>DocumentLibraryForm</New>
-</FormTemplates>
-</file>
-
-<file path=customXml/item4.xml><?xml version="1.0" encoding="utf-8"?>
 <?mso-contentType ?>
 <spe:Receivers xmlns:spe="http://schemas.microsoft.com/sharepoint/events">
   <Receiver>
@@ -9576,7 +9360,27 @@
 </spe:Receivers>
 </file>
 
+<file path=customXml/item4.xml><?xml version="1.0" encoding="utf-8"?>
+<?mso-contentType ?>
+<FormTemplates xmlns="http://schemas.microsoft.com/sharepoint/v3/contenttype/forms">
+  <Display>DocumentLibraryForm</Display>
+  <Edit>DocumentLibraryForm</Edit>
+  <New>DocumentLibraryForm</New>
+</FormTemplates>
+</file>
+
 <file path=customXml/itemProps1.xml><?xml version="1.0" encoding="utf-8"?>
+<ds:datastoreItem xmlns:ds="http://schemas.openxmlformats.org/officeDocument/2006/customXml" ds:itemID="{F47B9207-CE5C-49AD-B414-15CBFA246D65}">
+  <ds:schemaRefs>
+    <ds:schemaRef ds:uri="http://schemas.microsoft.com/office/2006/metadata/properties"/>
+    <ds:schemaRef ds:uri="http://schemas.microsoft.com/office/infopath/2007/PartnerControls"/>
+    <ds:schemaRef ds:uri="037063e9-a85e-4c78-8627-f1a9315663e5"/>
+    <ds:schemaRef ds:uri="027ed24f-5970-4294-be5c-0919c5aaa214"/>
+  </ds:schemaRefs>
+</ds:datastoreItem>
+</file>
+
+<file path=customXml/itemProps2.xml><?xml version="1.0" encoding="utf-8"?>
 <ds:datastoreItem xmlns:ds="http://schemas.openxmlformats.org/officeDocument/2006/customXml" ds:itemID="{B8E0886B-5092-4138-9EEE-28D3BFD5A483}">
   <ds:schemaRefs>
     <ds:schemaRef ds:uri="http://schemas.microsoft.com/office/2006/metadata/contentType"/>
@@ -9595,29 +9399,18 @@
 </ds:datastoreItem>
 </file>
 
-<file path=customXml/itemProps2.xml><?xml version="1.0" encoding="utf-8"?>
-<ds:datastoreItem xmlns:ds="http://schemas.openxmlformats.org/officeDocument/2006/customXml" ds:itemID="{F47B9207-CE5C-49AD-B414-15CBFA246D65}">
+<file path=customXml/itemProps3.xml><?xml version="1.0" encoding="utf-8"?>
+<ds:datastoreItem xmlns:ds="http://schemas.openxmlformats.org/officeDocument/2006/customXml" ds:itemID="{B9043294-8302-4947-B882-02D6486F929C}">
   <ds:schemaRefs>
-    <ds:schemaRef ds:uri="http://schemas.microsoft.com/office/2006/metadata/properties"/>
-    <ds:schemaRef ds:uri="http://schemas.microsoft.com/office/infopath/2007/PartnerControls"/>
-    <ds:schemaRef ds:uri="037063e9-a85e-4c78-8627-f1a9315663e5"/>
-    <ds:schemaRef ds:uri="027ed24f-5970-4294-be5c-0919c5aaa214"/>
+    <ds:schemaRef ds:uri="http://schemas.microsoft.com/sharepoint/events"/>
   </ds:schemaRefs>
 </ds:datastoreItem>
 </file>
 
-<file path=customXml/itemProps3.xml><?xml version="1.0" encoding="utf-8"?>
+<file path=customXml/itemProps4.xml><?xml version="1.0" encoding="utf-8"?>
 <ds:datastoreItem xmlns:ds="http://schemas.openxmlformats.org/officeDocument/2006/customXml" ds:itemID="{2DA015F3-603C-4688-A5F3-81D587DAB8C9}">
   <ds:schemaRefs>
     <ds:schemaRef ds:uri="http://schemas.microsoft.com/sharepoint/v3/contenttype/forms"/>
   </ds:schemaRefs>
 </ds:datastoreItem>
-</file>
-
-<file path=customXml/itemProps4.xml><?xml version="1.0" encoding="utf-8"?>
-<ds:datastoreItem xmlns:ds="http://schemas.openxmlformats.org/officeDocument/2006/customXml" ds:itemID="{B9043294-8302-4947-B882-02D6486F929C}">
-  <ds:schemaRefs>
-    <ds:schemaRef ds:uri="http://schemas.microsoft.com/sharepoint/events"/>
-  </ds:schemaRefs>
-</ds:datastoreItem>
 </file>
</xml_diff>